<commit_message>
player to host interaction, refactor
</commit_message>
<xml_diff>
--- a/logo-creation.pptx
+++ b/logo-creation.pptx
@@ -7,6 +7,7 @@
   <p:sldIdLst>
     <p:sldId id="256" r:id="rId2"/>
     <p:sldId id="257" r:id="rId3"/>
+    <p:sldId id="258" r:id="rId4"/>
   </p:sldIdLst>
   <p:sldSz cx="12192000" cy="6858000"/>
   <p:notesSz cx="6858000" cy="9144000"/>
@@ -260,7 +261,7 @@
           <a:p>
             <a:fld id="{9F2AEC97-2FAF-4B69-A725-24443561C9BC}" type="datetimeFigureOut">
               <a:rPr lang="en-US" smtClean="0"/>
-              <a:t>11/24/2021</a:t>
+              <a:t>4/9/2022</a:t>
             </a:fld>
             <a:endParaRPr lang="en-US"/>
           </a:p>
@@ -458,7 +459,7 @@
           <a:p>
             <a:fld id="{9F2AEC97-2FAF-4B69-A725-24443561C9BC}" type="datetimeFigureOut">
               <a:rPr lang="en-US" smtClean="0"/>
-              <a:t>11/24/2021</a:t>
+              <a:t>4/9/2022</a:t>
             </a:fld>
             <a:endParaRPr lang="en-US"/>
           </a:p>
@@ -666,7 +667,7 @@
           <a:p>
             <a:fld id="{9F2AEC97-2FAF-4B69-A725-24443561C9BC}" type="datetimeFigureOut">
               <a:rPr lang="en-US" smtClean="0"/>
-              <a:t>11/24/2021</a:t>
+              <a:t>4/9/2022</a:t>
             </a:fld>
             <a:endParaRPr lang="en-US"/>
           </a:p>
@@ -864,7 +865,7 @@
           <a:p>
             <a:fld id="{9F2AEC97-2FAF-4B69-A725-24443561C9BC}" type="datetimeFigureOut">
               <a:rPr lang="en-US" smtClean="0"/>
-              <a:t>11/24/2021</a:t>
+              <a:t>4/9/2022</a:t>
             </a:fld>
             <a:endParaRPr lang="en-US"/>
           </a:p>
@@ -1139,7 +1140,7 @@
           <a:p>
             <a:fld id="{9F2AEC97-2FAF-4B69-A725-24443561C9BC}" type="datetimeFigureOut">
               <a:rPr lang="en-US" smtClean="0"/>
-              <a:t>11/24/2021</a:t>
+              <a:t>4/9/2022</a:t>
             </a:fld>
             <a:endParaRPr lang="en-US"/>
           </a:p>
@@ -1404,7 +1405,7 @@
           <a:p>
             <a:fld id="{9F2AEC97-2FAF-4B69-A725-24443561C9BC}" type="datetimeFigureOut">
               <a:rPr lang="en-US" smtClean="0"/>
-              <a:t>11/24/2021</a:t>
+              <a:t>4/9/2022</a:t>
             </a:fld>
             <a:endParaRPr lang="en-US"/>
           </a:p>
@@ -1816,7 +1817,7 @@
           <a:p>
             <a:fld id="{9F2AEC97-2FAF-4B69-A725-24443561C9BC}" type="datetimeFigureOut">
               <a:rPr lang="en-US" smtClean="0"/>
-              <a:t>11/24/2021</a:t>
+              <a:t>4/9/2022</a:t>
             </a:fld>
             <a:endParaRPr lang="en-US"/>
           </a:p>
@@ -1957,7 +1958,7 @@
           <a:p>
             <a:fld id="{9F2AEC97-2FAF-4B69-A725-24443561C9BC}" type="datetimeFigureOut">
               <a:rPr lang="en-US" smtClean="0"/>
-              <a:t>11/24/2021</a:t>
+              <a:t>4/9/2022</a:t>
             </a:fld>
             <a:endParaRPr lang="en-US"/>
           </a:p>
@@ -2070,7 +2071,7 @@
           <a:p>
             <a:fld id="{9F2AEC97-2FAF-4B69-A725-24443561C9BC}" type="datetimeFigureOut">
               <a:rPr lang="en-US" smtClean="0"/>
-              <a:t>11/24/2021</a:t>
+              <a:t>4/9/2022</a:t>
             </a:fld>
             <a:endParaRPr lang="en-US"/>
           </a:p>
@@ -2381,7 +2382,7 @@
           <a:p>
             <a:fld id="{9F2AEC97-2FAF-4B69-A725-24443561C9BC}" type="datetimeFigureOut">
               <a:rPr lang="en-US" smtClean="0"/>
-              <a:t>11/24/2021</a:t>
+              <a:t>4/9/2022</a:t>
             </a:fld>
             <a:endParaRPr lang="en-US"/>
           </a:p>
@@ -2669,7 +2670,7 @@
           <a:p>
             <a:fld id="{9F2AEC97-2FAF-4B69-A725-24443561C9BC}" type="datetimeFigureOut">
               <a:rPr lang="en-US" smtClean="0"/>
-              <a:t>11/24/2021</a:t>
+              <a:t>4/9/2022</a:t>
             </a:fld>
             <a:endParaRPr lang="en-US"/>
           </a:p>
@@ -2910,7 +2911,7 @@
           <a:p>
             <a:fld id="{9F2AEC97-2FAF-4B69-A725-24443561C9BC}" type="datetimeFigureOut">
               <a:rPr lang="en-US" smtClean="0"/>
-              <a:t>11/24/2021</a:t>
+              <a:t>4/9/2022</a:t>
             </a:fld>
             <a:endParaRPr lang="en-US"/>
           </a:p>
@@ -3421,7 +3422,7 @@
         </p:nvGrpSpPr>
         <p:grpSpPr>
           <a:xfrm>
-            <a:off x="3940893" y="1827748"/>
+            <a:off x="3951302" y="1812377"/>
             <a:ext cx="3620655" cy="3582952"/>
             <a:chOff x="3940893" y="1827748"/>
             <a:chExt cx="3620655" cy="3582952"/>
@@ -16494,6 +16495,781 @@
 </p:sld>
 </file>
 
+<file path=ppt/slides/slide3.xml><?xml version="1.0" encoding="utf-8"?>
+<p:sld xmlns:a="http://schemas.openxmlformats.org/drawingml/2006/main" xmlns:r="http://schemas.openxmlformats.org/officeDocument/2006/relationships" xmlns:p="http://schemas.openxmlformats.org/presentationml/2006/main">
+  <p:cSld>
+    <p:spTree>
+      <p:nvGrpSpPr>
+        <p:cNvPr id="1" name=""/>
+        <p:cNvGrpSpPr/>
+        <p:nvPr/>
+      </p:nvGrpSpPr>
+      <p:grpSpPr>
+        <a:xfrm>
+          <a:off x="0" y="0"/>
+          <a:ext cx="0" cy="0"/>
+          <a:chOff x="0" y="0"/>
+          <a:chExt cx="0" cy="0"/>
+        </a:xfrm>
+      </p:grpSpPr>
+      <p:pic>
+        <p:nvPicPr>
+          <p:cNvPr id="5" name="Graphic 4" descr="Bee outline">
+            <a:extLst>
+              <a:ext uri="{FF2B5EF4-FFF2-40B4-BE49-F238E27FC236}">
+                <a16:creationId xmlns:a16="http://schemas.microsoft.com/office/drawing/2014/main" id="{B3310E39-E1AE-4D1B-BFAD-CB3C93AE211D}"/>
+              </a:ext>
+            </a:extLst>
+          </p:cNvPr>
+          <p:cNvPicPr>
+            <a:picLocks noChangeAspect="1"/>
+          </p:cNvPicPr>
+          <p:nvPr/>
+        </p:nvPicPr>
+        <p:blipFill>
+          <a:blip r:embed="rId2">
+            <a:extLst>
+              <a:ext uri="{28A0092B-C50C-407E-A947-70E740481C1C}">
+                <a14:useLocalDpi xmlns:a14="http://schemas.microsoft.com/office/drawing/2010/main" val="0"/>
+              </a:ext>
+              <a:ext uri="{96DAC541-7B7A-43D3-8B79-37D633B846F1}">
+                <asvg:svgBlip xmlns:asvg="http://schemas.microsoft.com/office/drawing/2016/SVG/main" r:embed="rId3"/>
+              </a:ext>
+            </a:extLst>
+          </a:blip>
+          <a:stretch>
+            <a:fillRect/>
+          </a:stretch>
+        </p:blipFill>
+        <p:spPr>
+          <a:xfrm>
+            <a:off x="1181100" y="1593075"/>
+            <a:ext cx="914400" cy="914400"/>
+          </a:xfrm>
+          <a:prstGeom prst="rect">
+            <a:avLst/>
+          </a:prstGeom>
+        </p:spPr>
+      </p:pic>
+      <p:pic>
+        <p:nvPicPr>
+          <p:cNvPr id="3" name="Graphic 2" descr="Fireworks with solid fill">
+            <a:extLst>
+              <a:ext uri="{FF2B5EF4-FFF2-40B4-BE49-F238E27FC236}">
+                <a16:creationId xmlns:a16="http://schemas.microsoft.com/office/drawing/2014/main" id="{F9BF700E-AEBF-4A11-9B3D-2CF0F3A3D0CF}"/>
+              </a:ext>
+            </a:extLst>
+          </p:cNvPr>
+          <p:cNvPicPr>
+            <a:picLocks noChangeAspect="1"/>
+          </p:cNvPicPr>
+          <p:nvPr/>
+        </p:nvPicPr>
+        <p:blipFill>
+          <a:blip r:embed="rId4">
+            <a:extLst>
+              <a:ext uri="{28A0092B-C50C-407E-A947-70E740481C1C}">
+                <a14:useLocalDpi xmlns:a14="http://schemas.microsoft.com/office/drawing/2010/main" val="0"/>
+              </a:ext>
+              <a:ext uri="{96DAC541-7B7A-43D3-8B79-37D633B846F1}">
+                <asvg:svgBlip xmlns:asvg="http://schemas.microsoft.com/office/drawing/2016/SVG/main" r:embed="rId5"/>
+              </a:ext>
+            </a:extLst>
+          </a:blip>
+          <a:stretch>
+            <a:fillRect/>
+          </a:stretch>
+        </p:blipFill>
+        <p:spPr>
+          <a:xfrm>
+            <a:off x="2722130" y="2171700"/>
+            <a:ext cx="914400" cy="914400"/>
+          </a:xfrm>
+          <a:prstGeom prst="rect">
+            <a:avLst/>
+          </a:prstGeom>
+        </p:spPr>
+      </p:pic>
+      <p:grpSp>
+        <p:nvGrpSpPr>
+          <p:cNvPr id="10" name="Group 9">
+            <a:extLst>
+              <a:ext uri="{FF2B5EF4-FFF2-40B4-BE49-F238E27FC236}">
+                <a16:creationId xmlns:a16="http://schemas.microsoft.com/office/drawing/2014/main" id="{9DA06675-CF0D-4B25-8C8D-BA98B96FE108}"/>
+              </a:ext>
+            </a:extLst>
+          </p:cNvPr>
+          <p:cNvGrpSpPr/>
+          <p:nvPr/>
+        </p:nvGrpSpPr>
+        <p:grpSpPr>
+          <a:xfrm>
+            <a:off x="5389760" y="1362806"/>
+            <a:ext cx="808357" cy="974502"/>
+            <a:chOff x="4265180" y="1827748"/>
+            <a:chExt cx="2972086" cy="3582952"/>
+          </a:xfrm>
+        </p:grpSpPr>
+        <p:pic>
+          <p:nvPicPr>
+            <p:cNvPr id="11" name="Graphic 10" descr="Confused person outline">
+              <a:extLst>
+                <a:ext uri="{FF2B5EF4-FFF2-40B4-BE49-F238E27FC236}">
+                  <a16:creationId xmlns:a16="http://schemas.microsoft.com/office/drawing/2014/main" id="{04C1CDB4-4C59-491B-8999-F788F17713F7}"/>
+                </a:ext>
+              </a:extLst>
+            </p:cNvPr>
+            <p:cNvPicPr>
+              <a:picLocks noChangeAspect="1"/>
+            </p:cNvPicPr>
+            <p:nvPr/>
+          </p:nvPicPr>
+          <p:blipFill rotWithShape="1">
+            <a:blip r:embed="rId6">
+              <a:extLst>
+                <a:ext uri="{28A0092B-C50C-407E-A947-70E740481C1C}">
+                  <a14:useLocalDpi xmlns:a14="http://schemas.microsoft.com/office/drawing/2010/main" val="0"/>
+                </a:ext>
+                <a:ext uri="{96DAC541-7B7A-43D3-8B79-37D633B846F1}">
+                  <asvg:svgBlip xmlns:asvg="http://schemas.microsoft.com/office/drawing/2016/SVG/main" r:embed="rId7"/>
+                </a:ext>
+              </a:extLst>
+            </a:blip>
+            <a:srcRect t="21016"/>
+            <a:stretch/>
+          </p:blipFill>
+          <p:spPr>
+            <a:xfrm>
+              <a:off x="4265180" y="3063240"/>
+              <a:ext cx="2972086" cy="2347460"/>
+            </a:xfrm>
+            <a:prstGeom prst="rect">
+              <a:avLst/>
+            </a:prstGeom>
+          </p:spPr>
+        </p:pic>
+        <p:grpSp>
+          <p:nvGrpSpPr>
+            <p:cNvPr id="13" name="Group 12">
+              <a:extLst>
+                <a:ext uri="{FF2B5EF4-FFF2-40B4-BE49-F238E27FC236}">
+                  <a16:creationId xmlns:a16="http://schemas.microsoft.com/office/drawing/2014/main" id="{A99AD951-DF51-40DC-B74F-BA35CD737CFF}"/>
+                </a:ext>
+              </a:extLst>
+            </p:cNvPr>
+            <p:cNvGrpSpPr/>
+            <p:nvPr/>
+          </p:nvGrpSpPr>
+          <p:grpSpPr>
+            <a:xfrm>
+              <a:off x="5022559" y="1827748"/>
+              <a:ext cx="1450162" cy="1438276"/>
+              <a:chOff x="5022559" y="1827748"/>
+              <a:chExt cx="1450162" cy="1438276"/>
+            </a:xfrm>
+            <a:blipFill>
+              <a:blip r:embed="rId8"/>
+              <a:tile tx="0" ty="0" sx="100000" sy="100000" flip="none" algn="tl"/>
+            </a:blipFill>
+          </p:grpSpPr>
+          <p:pic>
+            <p:nvPicPr>
+              <p:cNvPr id="14" name="Graphic 13" descr="Left Brain outline">
+                <a:extLst>
+                  <a:ext uri="{FF2B5EF4-FFF2-40B4-BE49-F238E27FC236}">
+                    <a16:creationId xmlns:a16="http://schemas.microsoft.com/office/drawing/2014/main" id="{F6671AA2-8DF6-4B52-B46F-4F3E4092D588}"/>
+                  </a:ext>
+                </a:extLst>
+              </p:cNvPr>
+              <p:cNvPicPr>
+                <a:picLocks noChangeAspect="1"/>
+              </p:cNvPicPr>
+              <p:nvPr/>
+            </p:nvPicPr>
+            <p:blipFill>
+              <a:blip r:embed="rId9">
+                <a:extLst>
+                  <a:ext uri="{28A0092B-C50C-407E-A947-70E740481C1C}">
+                    <a14:useLocalDpi xmlns:a14="http://schemas.microsoft.com/office/drawing/2010/main" val="0"/>
+                  </a:ext>
+                  <a:ext uri="{96DAC541-7B7A-43D3-8B79-37D633B846F1}">
+                    <asvg:svgBlip xmlns:asvg="http://schemas.microsoft.com/office/drawing/2016/SVG/main" r:embed="rId10"/>
+                  </a:ext>
+                </a:extLst>
+              </a:blip>
+              <a:stretch>
+                <a:fillRect/>
+              </a:stretch>
+            </p:blipFill>
+            <p:spPr>
+              <a:xfrm>
+                <a:off x="5022559" y="1827749"/>
+                <a:ext cx="1438275" cy="1438275"/>
+              </a:xfrm>
+              <a:prstGeom prst="rect">
+                <a:avLst/>
+              </a:prstGeom>
+            </p:spPr>
+          </p:pic>
+          <p:pic>
+            <p:nvPicPr>
+              <p:cNvPr id="15" name="Graphic 14" descr="Right Brain with solid fill">
+                <a:extLst>
+                  <a:ext uri="{FF2B5EF4-FFF2-40B4-BE49-F238E27FC236}">
+                    <a16:creationId xmlns:a16="http://schemas.microsoft.com/office/drawing/2014/main" id="{5142EB7E-0BBA-43DB-9DC6-801678466AFC}"/>
+                  </a:ext>
+                </a:extLst>
+              </p:cNvPr>
+              <p:cNvPicPr>
+                <a:picLocks noChangeAspect="1"/>
+              </p:cNvPicPr>
+              <p:nvPr/>
+            </p:nvPicPr>
+            <p:blipFill rotWithShape="1">
+              <a:blip r:embed="rId11">
+                <a:extLst>
+                  <a:ext uri="{28A0092B-C50C-407E-A947-70E740481C1C}">
+                    <a14:useLocalDpi xmlns:a14="http://schemas.microsoft.com/office/drawing/2010/main" val="0"/>
+                  </a:ext>
+                  <a:ext uri="{96DAC541-7B7A-43D3-8B79-37D633B846F1}">
+                    <asvg:svgBlip xmlns:asvg="http://schemas.microsoft.com/office/drawing/2016/SVG/main" r:embed="rId12"/>
+                  </a:ext>
+                </a:extLst>
+              </a:blip>
+              <a:srcRect l="49836"/>
+              <a:stretch/>
+            </p:blipFill>
+            <p:spPr>
+              <a:xfrm>
+                <a:off x="5751221" y="1827748"/>
+                <a:ext cx="721500" cy="1438275"/>
+              </a:xfrm>
+              <a:prstGeom prst="rect">
+                <a:avLst/>
+              </a:prstGeom>
+            </p:spPr>
+          </p:pic>
+        </p:grpSp>
+      </p:grpSp>
+      <p:pic>
+        <p:nvPicPr>
+          <p:cNvPr id="17" name="Graphic 16" descr="Confused person outline">
+            <a:extLst>
+              <a:ext uri="{FF2B5EF4-FFF2-40B4-BE49-F238E27FC236}">
+                <a16:creationId xmlns:a16="http://schemas.microsoft.com/office/drawing/2014/main" id="{F30C06CD-DD2B-4689-9A95-9930925F7E9F}"/>
+              </a:ext>
+            </a:extLst>
+          </p:cNvPr>
+          <p:cNvPicPr>
+            <a:picLocks noChangeAspect="1"/>
+          </p:cNvPicPr>
+          <p:nvPr/>
+        </p:nvPicPr>
+        <p:blipFill rotWithShape="1">
+          <a:blip r:embed="rId6">
+            <a:extLst>
+              <a:ext uri="{28A0092B-C50C-407E-A947-70E740481C1C}">
+                <a14:useLocalDpi xmlns:a14="http://schemas.microsoft.com/office/drawing/2010/main" val="0"/>
+              </a:ext>
+              <a:ext uri="{96DAC541-7B7A-43D3-8B79-37D633B846F1}">
+                <asvg:svgBlip xmlns:asvg="http://schemas.microsoft.com/office/drawing/2016/SVG/main" r:embed="rId7"/>
+              </a:ext>
+            </a:extLst>
+          </a:blip>
+          <a:srcRect t="21016"/>
+          <a:stretch/>
+        </p:blipFill>
+        <p:spPr>
+          <a:xfrm>
+            <a:off x="8295700" y="3129812"/>
+            <a:ext cx="2972086" cy="2347460"/>
+          </a:xfrm>
+          <a:prstGeom prst="rect">
+            <a:avLst/>
+          </a:prstGeom>
+        </p:spPr>
+      </p:pic>
+      <p:pic>
+        <p:nvPicPr>
+          <p:cNvPr id="22" name="Picture 21" descr="High Five Bee">
+            <a:extLst>
+              <a:ext uri="{FF2B5EF4-FFF2-40B4-BE49-F238E27FC236}">
+                <a16:creationId xmlns:a16="http://schemas.microsoft.com/office/drawing/2014/main" id="{FA153C6E-8782-458E-BED6-B4CA06F8E980}"/>
+              </a:ext>
+            </a:extLst>
+          </p:cNvPr>
+          <p:cNvPicPr>
+            <a:picLocks noChangeAspect="1"/>
+          </p:cNvPicPr>
+          <p:nvPr/>
+        </p:nvPicPr>
+        <p:blipFill>
+          <a:blip r:embed="rId13">
+            <a:extLst>
+              <a:ext uri="{28A0092B-C50C-407E-A947-70E740481C1C}">
+                <a14:useLocalDpi xmlns:a14="http://schemas.microsoft.com/office/drawing/2010/main" val="0"/>
+              </a:ext>
+            </a:extLst>
+          </a:blip>
+          <a:stretch>
+            <a:fillRect/>
+          </a:stretch>
+        </p:blipFill>
+        <p:spPr>
+          <a:xfrm>
+            <a:off x="9570946" y="577437"/>
+            <a:ext cx="1138382" cy="1138382"/>
+          </a:xfrm>
+          <a:prstGeom prst="rect">
+            <a:avLst/>
+          </a:prstGeom>
+        </p:spPr>
+      </p:pic>
+      <p:pic>
+        <p:nvPicPr>
+          <p:cNvPr id="24" name="Picture 23" descr="OMG Bee">
+            <a:extLst>
+              <a:ext uri="{FF2B5EF4-FFF2-40B4-BE49-F238E27FC236}">
+                <a16:creationId xmlns:a16="http://schemas.microsoft.com/office/drawing/2014/main" id="{AE63363B-F159-469C-AE9B-79151046FBAF}"/>
+              </a:ext>
+            </a:extLst>
+          </p:cNvPr>
+          <p:cNvPicPr>
+            <a:picLocks noChangeAspect="1"/>
+          </p:cNvPicPr>
+          <p:nvPr/>
+        </p:nvPicPr>
+        <p:blipFill>
+          <a:blip r:embed="rId14">
+            <a:extLst>
+              <a:ext uri="{28A0092B-C50C-407E-A947-70E740481C1C}">
+                <a14:useLocalDpi xmlns:a14="http://schemas.microsoft.com/office/drawing/2010/main" val="0"/>
+              </a:ext>
+            </a:extLst>
+          </a:blip>
+          <a:stretch>
+            <a:fillRect/>
+          </a:stretch>
+        </p:blipFill>
+        <p:spPr>
+          <a:xfrm>
+            <a:off x="1685405" y="2832357"/>
+            <a:ext cx="919183" cy="919183"/>
+          </a:xfrm>
+          <a:prstGeom prst="rect">
+            <a:avLst/>
+          </a:prstGeom>
+        </p:spPr>
+      </p:pic>
+      <p:pic>
+        <p:nvPicPr>
+          <p:cNvPr id="26" name="Picture 25" descr="Happy Bee">
+            <a:extLst>
+              <a:ext uri="{FF2B5EF4-FFF2-40B4-BE49-F238E27FC236}">
+                <a16:creationId xmlns:a16="http://schemas.microsoft.com/office/drawing/2014/main" id="{AA717150-4049-4318-824E-9EF3CBE82540}"/>
+              </a:ext>
+            </a:extLst>
+          </p:cNvPr>
+          <p:cNvPicPr>
+            <a:picLocks noChangeAspect="1"/>
+          </p:cNvPicPr>
+          <p:nvPr/>
+        </p:nvPicPr>
+        <p:blipFill>
+          <a:blip r:embed="rId15">
+            <a:extLst>
+              <a:ext uri="{28A0092B-C50C-407E-A947-70E740481C1C}">
+                <a14:useLocalDpi xmlns:a14="http://schemas.microsoft.com/office/drawing/2010/main" val="0"/>
+              </a:ext>
+            </a:extLst>
+          </a:blip>
+          <a:stretch>
+            <a:fillRect/>
+          </a:stretch>
+        </p:blipFill>
+        <p:spPr>
+          <a:xfrm>
+            <a:off x="4300203" y="1418125"/>
+            <a:ext cx="919183" cy="919183"/>
+          </a:xfrm>
+          <a:prstGeom prst="rect">
+            <a:avLst/>
+          </a:prstGeom>
+        </p:spPr>
+      </p:pic>
+      <p:pic>
+        <p:nvPicPr>
+          <p:cNvPr id="28" name="Picture 27" descr="Angry Bee">
+            <a:extLst>
+              <a:ext uri="{FF2B5EF4-FFF2-40B4-BE49-F238E27FC236}">
+                <a16:creationId xmlns:a16="http://schemas.microsoft.com/office/drawing/2014/main" id="{2E08ACEA-F6FB-41B5-9D27-59C71C4C1CB2}"/>
+              </a:ext>
+            </a:extLst>
+          </p:cNvPr>
+          <p:cNvPicPr>
+            <a:picLocks noChangeAspect="1"/>
+          </p:cNvPicPr>
+          <p:nvPr/>
+        </p:nvPicPr>
+        <p:blipFill>
+          <a:blip r:embed="rId16">
+            <a:extLst>
+              <a:ext uri="{28A0092B-C50C-407E-A947-70E740481C1C}">
+                <a14:useLocalDpi xmlns:a14="http://schemas.microsoft.com/office/drawing/2010/main" val="0"/>
+              </a:ext>
+            </a:extLst>
+          </a:blip>
+          <a:stretch>
+            <a:fillRect/>
+          </a:stretch>
+        </p:blipFill>
+        <p:spPr>
+          <a:xfrm>
+            <a:off x="8240715" y="577437"/>
+            <a:ext cx="919183" cy="919183"/>
+          </a:xfrm>
+          <a:prstGeom prst="rect">
+            <a:avLst/>
+          </a:prstGeom>
+        </p:spPr>
+      </p:pic>
+      <p:pic>
+        <p:nvPicPr>
+          <p:cNvPr id="30" name="Picture 29" descr="Confused Bee">
+            <a:extLst>
+              <a:ext uri="{FF2B5EF4-FFF2-40B4-BE49-F238E27FC236}">
+                <a16:creationId xmlns:a16="http://schemas.microsoft.com/office/drawing/2014/main" id="{5055DD33-7372-45D0-8A52-E946117F11F9}"/>
+              </a:ext>
+            </a:extLst>
+          </p:cNvPr>
+          <p:cNvPicPr>
+            <a:picLocks noChangeAspect="1"/>
+          </p:cNvPicPr>
+          <p:nvPr/>
+        </p:nvPicPr>
+        <p:blipFill>
+          <a:blip r:embed="rId17">
+            <a:extLst>
+              <a:ext uri="{28A0092B-C50C-407E-A947-70E740481C1C}">
+                <a14:useLocalDpi xmlns:a14="http://schemas.microsoft.com/office/drawing/2010/main" val="0"/>
+              </a:ext>
+            </a:extLst>
+          </a:blip>
+          <a:stretch>
+            <a:fillRect/>
+          </a:stretch>
+        </p:blipFill>
+        <p:spPr>
+          <a:xfrm>
+            <a:off x="9635273" y="796636"/>
+            <a:ext cx="919183" cy="919183"/>
+          </a:xfrm>
+          <a:prstGeom prst="rect">
+            <a:avLst/>
+          </a:prstGeom>
+        </p:spPr>
+      </p:pic>
+      <p:pic>
+        <p:nvPicPr>
+          <p:cNvPr id="32" name="Picture 31" descr="Party Bee">
+            <a:extLst>
+              <a:ext uri="{FF2B5EF4-FFF2-40B4-BE49-F238E27FC236}">
+                <a16:creationId xmlns:a16="http://schemas.microsoft.com/office/drawing/2014/main" id="{474129AA-D2BB-4A96-BF5A-49A2BE33FD21}"/>
+              </a:ext>
+            </a:extLst>
+          </p:cNvPr>
+          <p:cNvPicPr>
+            <a:picLocks noChangeAspect="1"/>
+          </p:cNvPicPr>
+          <p:nvPr/>
+        </p:nvPicPr>
+        <p:blipFill>
+          <a:blip r:embed="rId18">
+            <a:extLst>
+              <a:ext uri="{28A0092B-C50C-407E-A947-70E740481C1C}">
+                <a14:useLocalDpi xmlns:a14="http://schemas.microsoft.com/office/drawing/2010/main" val="0"/>
+              </a:ext>
+            </a:extLst>
+          </a:blip>
+          <a:stretch>
+            <a:fillRect/>
+          </a:stretch>
+        </p:blipFill>
+        <p:spPr>
+          <a:xfrm>
+            <a:off x="6972616" y="556511"/>
+            <a:ext cx="919183" cy="919183"/>
+          </a:xfrm>
+          <a:prstGeom prst="rect">
+            <a:avLst/>
+          </a:prstGeom>
+        </p:spPr>
+      </p:pic>
+      <p:pic>
+        <p:nvPicPr>
+          <p:cNvPr id="34" name="Picture 33" descr="Love Bee">
+            <a:extLst>
+              <a:ext uri="{FF2B5EF4-FFF2-40B4-BE49-F238E27FC236}">
+                <a16:creationId xmlns:a16="http://schemas.microsoft.com/office/drawing/2014/main" id="{D4B702D2-DB54-485C-B4E6-57B6291DCE0A}"/>
+              </a:ext>
+            </a:extLst>
+          </p:cNvPr>
+          <p:cNvPicPr>
+            <a:picLocks noChangeAspect="1"/>
+          </p:cNvPicPr>
+          <p:nvPr/>
+        </p:nvPicPr>
+        <p:blipFill>
+          <a:blip r:embed="rId19">
+            <a:extLst>
+              <a:ext uri="{28A0092B-C50C-407E-A947-70E740481C1C}">
+                <a14:useLocalDpi xmlns:a14="http://schemas.microsoft.com/office/drawing/2010/main" val="0"/>
+              </a:ext>
+            </a:extLst>
+          </a:blip>
+          <a:stretch>
+            <a:fillRect/>
+          </a:stretch>
+        </p:blipFill>
+        <p:spPr>
+          <a:xfrm>
+            <a:off x="9767888" y="2050275"/>
+            <a:ext cx="919183" cy="919183"/>
+          </a:xfrm>
+          <a:prstGeom prst="rect">
+            <a:avLst/>
+          </a:prstGeom>
+        </p:spPr>
+      </p:pic>
+      <p:pic>
+        <p:nvPicPr>
+          <p:cNvPr id="36" name="Picture 35" descr="OMW Bee">
+            <a:extLst>
+              <a:ext uri="{FF2B5EF4-FFF2-40B4-BE49-F238E27FC236}">
+                <a16:creationId xmlns:a16="http://schemas.microsoft.com/office/drawing/2014/main" id="{9B2BBA66-BBF5-40DA-BDC4-5F723A8DC1E8}"/>
+              </a:ext>
+            </a:extLst>
+          </p:cNvPr>
+          <p:cNvPicPr>
+            <a:picLocks noChangeAspect="1"/>
+          </p:cNvPicPr>
+          <p:nvPr/>
+        </p:nvPicPr>
+        <p:blipFill>
+          <a:blip r:embed="rId20">
+            <a:extLst>
+              <a:ext uri="{28A0092B-C50C-407E-A947-70E740481C1C}">
+                <a14:useLocalDpi xmlns:a14="http://schemas.microsoft.com/office/drawing/2010/main" val="0"/>
+              </a:ext>
+            </a:extLst>
+          </a:blip>
+          <a:stretch>
+            <a:fillRect/>
+          </a:stretch>
+        </p:blipFill>
+        <p:spPr>
+          <a:xfrm>
+            <a:off x="10761435" y="5074721"/>
+            <a:ext cx="919183" cy="919183"/>
+          </a:xfrm>
+          <a:prstGeom prst="rect">
+            <a:avLst/>
+          </a:prstGeom>
+        </p:spPr>
+      </p:pic>
+      <p:pic>
+        <p:nvPicPr>
+          <p:cNvPr id="38" name="Picture 37" descr="Sick Bee">
+            <a:extLst>
+              <a:ext uri="{FF2B5EF4-FFF2-40B4-BE49-F238E27FC236}">
+                <a16:creationId xmlns:a16="http://schemas.microsoft.com/office/drawing/2014/main" id="{4EDF2596-A3A0-4FAC-BD1B-038724266437}"/>
+              </a:ext>
+            </a:extLst>
+          </p:cNvPr>
+          <p:cNvPicPr>
+            <a:picLocks noChangeAspect="1"/>
+          </p:cNvPicPr>
+          <p:nvPr/>
+        </p:nvPicPr>
+        <p:blipFill>
+          <a:blip r:embed="rId21">
+            <a:extLst>
+              <a:ext uri="{28A0092B-C50C-407E-A947-70E740481C1C}">
+                <a14:useLocalDpi xmlns:a14="http://schemas.microsoft.com/office/drawing/2010/main" val="0"/>
+              </a:ext>
+            </a:extLst>
+          </a:blip>
+          <a:stretch>
+            <a:fillRect/>
+          </a:stretch>
+        </p:blipFill>
+        <p:spPr>
+          <a:xfrm>
+            <a:off x="11255909" y="5652353"/>
+            <a:ext cx="919183" cy="919183"/>
+          </a:xfrm>
+          <a:prstGeom prst="rect">
+            <a:avLst/>
+          </a:prstGeom>
+        </p:spPr>
+      </p:pic>
+      <p:pic>
+        <p:nvPicPr>
+          <p:cNvPr id="40" name="Picture 39" descr="Sad Bee">
+            <a:extLst>
+              <a:ext uri="{FF2B5EF4-FFF2-40B4-BE49-F238E27FC236}">
+                <a16:creationId xmlns:a16="http://schemas.microsoft.com/office/drawing/2014/main" id="{AEBF37EF-74C7-41B4-A58A-09AB1CC88DAF}"/>
+              </a:ext>
+            </a:extLst>
+          </p:cNvPr>
+          <p:cNvPicPr>
+            <a:picLocks noChangeAspect="1"/>
+          </p:cNvPicPr>
+          <p:nvPr/>
+        </p:nvPicPr>
+        <p:blipFill>
+          <a:blip r:embed="rId22">
+            <a:extLst>
+              <a:ext uri="{28A0092B-C50C-407E-A947-70E740481C1C}">
+                <a14:useLocalDpi xmlns:a14="http://schemas.microsoft.com/office/drawing/2010/main" val="0"/>
+              </a:ext>
+            </a:extLst>
+          </a:blip>
+          <a:stretch>
+            <a:fillRect/>
+          </a:stretch>
+        </p:blipFill>
+        <p:spPr>
+          <a:xfrm>
+            <a:off x="11324176" y="444487"/>
+            <a:ext cx="919183" cy="919183"/>
+          </a:xfrm>
+          <a:prstGeom prst="rect">
+            <a:avLst/>
+          </a:prstGeom>
+        </p:spPr>
+      </p:pic>
+      <p:pic>
+        <p:nvPicPr>
+          <p:cNvPr id="44" name="Picture 43" descr="Fist Bump Bee">
+            <a:extLst>
+              <a:ext uri="{FF2B5EF4-FFF2-40B4-BE49-F238E27FC236}">
+                <a16:creationId xmlns:a16="http://schemas.microsoft.com/office/drawing/2014/main" id="{81CBD4A7-4B65-4B2C-AABF-74F307626AF8}"/>
+              </a:ext>
+            </a:extLst>
+          </p:cNvPr>
+          <p:cNvPicPr>
+            <a:picLocks noChangeAspect="1"/>
+          </p:cNvPicPr>
+          <p:nvPr/>
+        </p:nvPicPr>
+        <p:blipFill>
+          <a:blip r:embed="rId23">
+            <a:extLst>
+              <a:ext uri="{28A0092B-C50C-407E-A947-70E740481C1C}">
+                <a14:useLocalDpi xmlns:a14="http://schemas.microsoft.com/office/drawing/2010/main" val="0"/>
+              </a:ext>
+            </a:extLst>
+          </a:blip>
+          <a:stretch>
+            <a:fillRect/>
+          </a:stretch>
+        </p:blipFill>
+        <p:spPr>
+          <a:xfrm>
+            <a:off x="11102620" y="3931491"/>
+            <a:ext cx="919183" cy="919183"/>
+          </a:xfrm>
+          <a:prstGeom prst="rect">
+            <a:avLst/>
+          </a:prstGeom>
+        </p:spPr>
+      </p:pic>
+      <p:pic>
+        <p:nvPicPr>
+          <p:cNvPr id="46" name="Picture 45" descr="Ashamed Bee">
+            <a:extLst>
+              <a:ext uri="{FF2B5EF4-FFF2-40B4-BE49-F238E27FC236}">
+                <a16:creationId xmlns:a16="http://schemas.microsoft.com/office/drawing/2014/main" id="{10DECE10-6FB9-46E3-AAC2-5A6CB9C77111}"/>
+              </a:ext>
+            </a:extLst>
+          </p:cNvPr>
+          <p:cNvPicPr>
+            <a:picLocks noChangeAspect="1"/>
+          </p:cNvPicPr>
+          <p:nvPr/>
+        </p:nvPicPr>
+        <p:blipFill>
+          <a:blip r:embed="rId24">
+            <a:extLst>
+              <a:ext uri="{28A0092B-C50C-407E-A947-70E740481C1C}">
+                <a14:useLocalDpi xmlns:a14="http://schemas.microsoft.com/office/drawing/2010/main" val="0"/>
+              </a:ext>
+            </a:extLst>
+          </a:blip>
+          <a:stretch>
+            <a:fillRect/>
+          </a:stretch>
+        </p:blipFill>
+        <p:spPr>
+          <a:xfrm>
+            <a:off x="11010900" y="1475694"/>
+            <a:ext cx="919183" cy="919183"/>
+          </a:xfrm>
+          <a:prstGeom prst="rect">
+            <a:avLst/>
+          </a:prstGeom>
+        </p:spPr>
+      </p:pic>
+      <p:pic>
+        <p:nvPicPr>
+          <p:cNvPr id="48" name="Picture 47" descr="Hi Bee">
+            <a:extLst>
+              <a:ext uri="{FF2B5EF4-FFF2-40B4-BE49-F238E27FC236}">
+                <a16:creationId xmlns:a16="http://schemas.microsoft.com/office/drawing/2014/main" id="{20960B96-5B1A-4C25-90A6-B5FB4B2861BB}"/>
+              </a:ext>
+            </a:extLst>
+          </p:cNvPr>
+          <p:cNvPicPr>
+            <a:picLocks noChangeAspect="1"/>
+          </p:cNvPicPr>
+          <p:nvPr/>
+        </p:nvPicPr>
+        <p:blipFill>
+          <a:blip r:embed="rId25">
+            <a:extLst>
+              <a:ext uri="{28A0092B-C50C-407E-A947-70E740481C1C}">
+                <a14:useLocalDpi xmlns:a14="http://schemas.microsoft.com/office/drawing/2010/main" val="0"/>
+              </a:ext>
+            </a:extLst>
+          </a:blip>
+          <a:stretch>
+            <a:fillRect/>
+          </a:stretch>
+        </p:blipFill>
+        <p:spPr>
+          <a:xfrm>
+            <a:off x="11212064" y="2670220"/>
+            <a:ext cx="919183" cy="919183"/>
+          </a:xfrm>
+          <a:prstGeom prst="rect">
+            <a:avLst/>
+          </a:prstGeom>
+        </p:spPr>
+      </p:pic>
+    </p:spTree>
+    <p:extLst>
+      <p:ext uri="{BB962C8B-B14F-4D97-AF65-F5344CB8AC3E}">
+        <p14:creationId xmlns:p14="http://schemas.microsoft.com/office/powerpoint/2010/main" val="1800878157"/>
+      </p:ext>
+    </p:extLst>
+  </p:cSld>
+  <p:clrMapOvr>
+    <a:masterClrMapping/>
+  </p:clrMapOvr>
+</p:sld>
+</file>
+
 <file path=ppt/theme/theme1.xml><?xml version="1.0" encoding="utf-8"?>
 <a:theme xmlns:a="http://schemas.openxmlformats.org/drawingml/2006/main" name="Office Theme">
   <a:themeElements>

</xml_diff>